<commit_message>
Trying to get result centered
</commit_message>
<xml_diff>
--- a/imageDesigner.pptx
+++ b/imageDesigner.pptx
@@ -238,7 +238,7 @@
           <a:p>
             <a:fld id="{A3CF5E85-F0AE-4020-842A-D0F96F6B62B1}" type="datetimeFigureOut">
               <a:rPr lang="en-US" smtClean="0"/>
-              <a:t>6/13/2015</a:t>
+              <a:t>6/17/15</a:t>
             </a:fld>
             <a:endParaRPr lang="en-US"/>
           </a:p>
@@ -408,7 +408,7 @@
           <a:p>
             <a:fld id="{A3CF5E85-F0AE-4020-842A-D0F96F6B62B1}" type="datetimeFigureOut">
               <a:rPr lang="en-US" smtClean="0"/>
-              <a:t>6/13/2015</a:t>
+              <a:t>6/17/15</a:t>
             </a:fld>
             <a:endParaRPr lang="en-US"/>
           </a:p>
@@ -588,7 +588,7 @@
           <a:p>
             <a:fld id="{A3CF5E85-F0AE-4020-842A-D0F96F6B62B1}" type="datetimeFigureOut">
               <a:rPr lang="en-US" smtClean="0"/>
-              <a:t>6/13/2015</a:t>
+              <a:t>6/17/15</a:t>
             </a:fld>
             <a:endParaRPr lang="en-US"/>
           </a:p>
@@ -758,7 +758,7 @@
           <a:p>
             <a:fld id="{A3CF5E85-F0AE-4020-842A-D0F96F6B62B1}" type="datetimeFigureOut">
               <a:rPr lang="en-US" smtClean="0"/>
-              <a:t>6/13/2015</a:t>
+              <a:t>6/17/15</a:t>
             </a:fld>
             <a:endParaRPr lang="en-US"/>
           </a:p>
@@ -1004,7 +1004,7 @@
           <a:p>
             <a:fld id="{A3CF5E85-F0AE-4020-842A-D0F96F6B62B1}" type="datetimeFigureOut">
               <a:rPr lang="en-US" smtClean="0"/>
-              <a:t>6/13/2015</a:t>
+              <a:t>6/17/15</a:t>
             </a:fld>
             <a:endParaRPr lang="en-US"/>
           </a:p>
@@ -1236,7 +1236,7 @@
           <a:p>
             <a:fld id="{A3CF5E85-F0AE-4020-842A-D0F96F6B62B1}" type="datetimeFigureOut">
               <a:rPr lang="en-US" smtClean="0"/>
-              <a:t>6/13/2015</a:t>
+              <a:t>6/17/15</a:t>
             </a:fld>
             <a:endParaRPr lang="en-US"/>
           </a:p>
@@ -1603,7 +1603,7 @@
           <a:p>
             <a:fld id="{A3CF5E85-F0AE-4020-842A-D0F96F6B62B1}" type="datetimeFigureOut">
               <a:rPr lang="en-US" smtClean="0"/>
-              <a:t>6/13/2015</a:t>
+              <a:t>6/17/15</a:t>
             </a:fld>
             <a:endParaRPr lang="en-US"/>
           </a:p>
@@ -1721,7 +1721,7 @@
           <a:p>
             <a:fld id="{A3CF5E85-F0AE-4020-842A-D0F96F6B62B1}" type="datetimeFigureOut">
               <a:rPr lang="en-US" smtClean="0"/>
-              <a:t>6/13/2015</a:t>
+              <a:t>6/17/15</a:t>
             </a:fld>
             <a:endParaRPr lang="en-US"/>
           </a:p>
@@ -1816,7 +1816,7 @@
           <a:p>
             <a:fld id="{A3CF5E85-F0AE-4020-842A-D0F96F6B62B1}" type="datetimeFigureOut">
               <a:rPr lang="en-US" smtClean="0"/>
-              <a:t>6/13/2015</a:t>
+              <a:t>6/17/15</a:t>
             </a:fld>
             <a:endParaRPr lang="en-US"/>
           </a:p>
@@ -2093,7 +2093,7 @@
           <a:p>
             <a:fld id="{A3CF5E85-F0AE-4020-842A-D0F96F6B62B1}" type="datetimeFigureOut">
               <a:rPr lang="en-US" smtClean="0"/>
-              <a:t>6/13/2015</a:t>
+              <a:t>6/17/15</a:t>
             </a:fld>
             <a:endParaRPr lang="en-US"/>
           </a:p>
@@ -2346,7 +2346,7 @@
           <a:p>
             <a:fld id="{A3CF5E85-F0AE-4020-842A-D0F96F6B62B1}" type="datetimeFigureOut">
               <a:rPr lang="en-US" smtClean="0"/>
-              <a:t>6/13/2015</a:t>
+              <a:t>6/17/15</a:t>
             </a:fld>
             <a:endParaRPr lang="en-US"/>
           </a:p>
@@ -2559,7 +2559,7 @@
           <a:p>
             <a:fld id="{A3CF5E85-F0AE-4020-842A-D0F96F6B62B1}" type="datetimeFigureOut">
               <a:rPr lang="en-US" smtClean="0"/>
-              <a:t>6/13/2015</a:t>
+              <a:t>6/17/15</a:t>
             </a:fld>
             <a:endParaRPr lang="en-US"/>
           </a:p>
@@ -3193,6 +3193,235 @@
           </a:p>
         </p:txBody>
       </p:sp>
+      <p:sp>
+        <p:nvSpPr>
+          <p:cNvPr id="5" name="Donut 4"/>
+          <p:cNvSpPr/>
+          <p:nvPr/>
+        </p:nvSpPr>
+        <p:spPr>
+          <a:xfrm>
+            <a:off x="5705870" y="4467247"/>
+            <a:ext cx="1571222" cy="1571223"/>
+          </a:xfrm>
+          <a:prstGeom prst="donut">
+            <a:avLst/>
+          </a:prstGeom>
+          <a:solidFill>
+            <a:srgbClr val="C00000"/>
+          </a:solidFill>
+          <a:ln>
+            <a:noFill/>
+          </a:ln>
+          <a:effectLst>
+            <a:glow rad="101600">
+              <a:srgbClr val="FF3300">
+                <a:alpha val="40000"/>
+              </a:srgbClr>
+            </a:glow>
+            <a:outerShdw blurRad="190500" dist="228600" dir="2700000" algn="ctr">
+              <a:srgbClr val="000000">
+                <a:alpha val="30000"/>
+              </a:srgbClr>
+            </a:outerShdw>
+          </a:effectLst>
+          <a:scene3d>
+            <a:camera prst="orthographicFront">
+              <a:rot lat="0" lon="0" rev="0"/>
+            </a:camera>
+            <a:lightRig rig="glow" dir="t">
+              <a:rot lat="0" lon="0" rev="4800000"/>
+            </a:lightRig>
+          </a:scene3d>
+          <a:sp3d prstMaterial="matte">
+            <a:bevelT w="127000" h="63500" prst="divot"/>
+          </a:sp3d>
+        </p:spPr>
+        <p:style>
+          <a:lnRef idx="2">
+            <a:schemeClr val="accent1">
+              <a:shade val="50000"/>
+            </a:schemeClr>
+          </a:lnRef>
+          <a:fillRef idx="1">
+            <a:schemeClr val="accent1"/>
+          </a:fillRef>
+          <a:effectRef idx="0">
+            <a:schemeClr val="accent1"/>
+          </a:effectRef>
+          <a:fontRef idx="minor">
+            <a:schemeClr val="lt1"/>
+          </a:fontRef>
+        </p:style>
+        <p:txBody>
+          <a:bodyPr rtlCol="0" anchor="ctr"/>
+          <a:lstStyle/>
+          <a:p>
+            <a:pPr algn="ctr"/>
+            <a:endParaRPr lang="en-US">
+              <a:effectLst>
+                <a:glow rad="228600">
+                  <a:schemeClr val="accent1">
+                    <a:satMod val="175000"/>
+                    <a:alpha val="40000"/>
+                  </a:schemeClr>
+                </a:glow>
+              </a:effectLst>
+            </a:endParaRPr>
+          </a:p>
+        </p:txBody>
+      </p:sp>
+      <p:sp>
+        <p:nvSpPr>
+          <p:cNvPr id="6" name="Multiply 5"/>
+          <p:cNvSpPr/>
+          <p:nvPr/>
+        </p:nvSpPr>
+        <p:spPr>
+          <a:xfrm>
+            <a:off x="7800833" y="4109858"/>
+            <a:ext cx="2286000" cy="2286000"/>
+          </a:xfrm>
+          <a:prstGeom prst="mathMultiply">
+            <a:avLst/>
+          </a:prstGeom>
+          <a:solidFill>
+            <a:srgbClr val="C00000"/>
+          </a:solidFill>
+          <a:ln>
+            <a:noFill/>
+          </a:ln>
+          <a:effectLst>
+            <a:glow rad="101600">
+              <a:srgbClr val="FF3300">
+                <a:alpha val="40000"/>
+              </a:srgbClr>
+            </a:glow>
+            <a:outerShdw blurRad="190500" dist="228600" dir="2700000" algn="ctr">
+              <a:srgbClr val="000000">
+                <a:alpha val="30000"/>
+              </a:srgbClr>
+            </a:outerShdw>
+          </a:effectLst>
+          <a:scene3d>
+            <a:camera prst="orthographicFront">
+              <a:rot lat="0" lon="0" rev="0"/>
+            </a:camera>
+            <a:lightRig rig="glow" dir="t">
+              <a:rot lat="0" lon="0" rev="4800000"/>
+            </a:lightRig>
+          </a:scene3d>
+          <a:sp3d prstMaterial="matte">
+            <a:bevelT w="127000" h="63500" prst="divot"/>
+          </a:sp3d>
+        </p:spPr>
+        <p:style>
+          <a:lnRef idx="2">
+            <a:schemeClr val="accent1">
+              <a:shade val="50000"/>
+            </a:schemeClr>
+          </a:lnRef>
+          <a:fillRef idx="1">
+            <a:schemeClr val="accent1"/>
+          </a:fillRef>
+          <a:effectRef idx="0">
+            <a:schemeClr val="accent1"/>
+          </a:effectRef>
+          <a:fontRef idx="minor">
+            <a:schemeClr val="lt1"/>
+          </a:fontRef>
+        </p:style>
+        <p:txBody>
+          <a:bodyPr rtlCol="0" anchor="ctr"/>
+          <a:lstStyle/>
+          <a:p>
+            <a:pPr algn="ctr"/>
+            <a:endParaRPr lang="en-US">
+              <a:effectLst>
+                <a:glow rad="228600">
+                  <a:schemeClr val="accent1">
+                    <a:satMod val="175000"/>
+                    <a:alpha val="40000"/>
+                  </a:schemeClr>
+                </a:glow>
+              </a:effectLst>
+            </a:endParaRPr>
+          </a:p>
+        </p:txBody>
+      </p:sp>
+      <p:sp>
+        <p:nvSpPr>
+          <p:cNvPr id="7" name="Rectangle 6"/>
+          <p:cNvSpPr/>
+          <p:nvPr/>
+        </p:nvSpPr>
+        <p:spPr>
+          <a:xfrm>
+            <a:off x="1753129" y="3978923"/>
+            <a:ext cx="2286000" cy="2286000"/>
+          </a:xfrm>
+          <a:prstGeom prst="rect">
+            <a:avLst/>
+          </a:prstGeom>
+          <a:noFill/>
+          <a:ln w="76200">
+            <a:solidFill>
+              <a:srgbClr val="7030A0"/>
+            </a:solidFill>
+          </a:ln>
+          <a:effectLst>
+            <a:glow rad="101600">
+              <a:srgbClr val="7030A0">
+                <a:alpha val="40000"/>
+              </a:srgbClr>
+            </a:glow>
+          </a:effectLst>
+          <a:scene3d>
+            <a:camera prst="orthographicFront">
+              <a:rot lat="0" lon="0" rev="0"/>
+            </a:camera>
+            <a:lightRig rig="glow" dir="t">
+              <a:rot lat="0" lon="0" rev="4800000"/>
+            </a:lightRig>
+          </a:scene3d>
+          <a:sp3d prstMaterial="matte">
+            <a:bevelT w="127000" h="63500" prst="divot"/>
+          </a:sp3d>
+        </p:spPr>
+        <p:style>
+          <a:lnRef idx="2">
+            <a:schemeClr val="accent1">
+              <a:shade val="50000"/>
+            </a:schemeClr>
+          </a:lnRef>
+          <a:fillRef idx="1">
+            <a:schemeClr val="accent1"/>
+          </a:fillRef>
+          <a:effectRef idx="0">
+            <a:schemeClr val="accent1"/>
+          </a:effectRef>
+          <a:fontRef idx="minor">
+            <a:schemeClr val="lt1"/>
+          </a:fontRef>
+        </p:style>
+        <p:txBody>
+          <a:bodyPr rtlCol="0" anchor="ctr"/>
+          <a:lstStyle/>
+          <a:p>
+            <a:pPr algn="ctr"/>
+            <a:endParaRPr lang="en-US">
+              <a:effectLst>
+                <a:glow rad="228600">
+                  <a:schemeClr val="accent1">
+                    <a:satMod val="175000"/>
+                    <a:alpha val="40000"/>
+                  </a:schemeClr>
+                </a:glow>
+              </a:effectLst>
+            </a:endParaRPr>
+          </a:p>
+        </p:txBody>
+      </p:sp>
     </p:spTree>
     <p:extLst>
       <p:ext uri="{BB962C8B-B14F-4D97-AF65-F5344CB8AC3E}">
@@ -3203,6 +3432,13 @@
   <p:clrMapOvr>
     <a:masterClrMapping/>
   </p:clrMapOvr>
+  <p:timing>
+    <p:tnLst>
+      <p:par>
+        <p:cTn xmlns:p14="http://schemas.microsoft.com/office/powerpoint/2010/main" id="1" dur="indefinite" restart="never" nodeType="tmRoot"/>
+      </p:par>
+    </p:tnLst>
+  </p:timing>
 </p:sld>
 </file>
 
@@ -3249,7 +3485,7 @@
     </a:clrScheme>
     <a:fontScheme name="Office">
       <a:majorFont>
-        <a:latin typeface="Calibri Light" panose="020F0302020204030204"/>
+        <a:latin typeface="Calibri Light"/>
         <a:ea typeface=""/>
         <a:cs typeface=""/>
         <a:font script="Jpan" typeface="ＭＳ Ｐゴシック"/>
@@ -3284,7 +3520,7 @@
         <a:font script="Geor" typeface="Sylfaen"/>
       </a:majorFont>
       <a:minorFont>
-        <a:latin typeface="Calibri" panose="020F0502020204030204"/>
+        <a:latin typeface="Calibri"/>
         <a:ea typeface=""/>
         <a:cs typeface=""/>
         <a:font script="Jpan" typeface="ＭＳ Ｐゴシック"/>
@@ -3461,7 +3697,7 @@
   <a:extraClrSchemeLst/>
   <a:extLst>
     <a:ext uri="{05A4C25C-085E-4340-85A3-A5531E510DB2}">
-      <thm15:themeFamily xmlns:thm15="http://schemas.microsoft.com/office/thememl/2012/main" name="Office Theme" id="{62F939B6-93AF-4DB8-9C6B-D6C7DFDC589F}" vid="{4A3C46E8-61CC-4603-A589-7422A47A8E4A}"/>
+      <thm15:themeFamily xmlns:thm15="http://schemas.microsoft.com/office/thememl/2012/main" xmlns="" name="Office Theme" id="{62F939B6-93AF-4DB8-9C6B-D6C7DFDC589F}" vid="{4A3C46E8-61CC-4603-A589-7422A47A8E4A}"/>
     </a:ext>
   </a:extLst>
 </a:theme>

</xml_diff>

<commit_message>
got everything but theme screen to work
</commit_message>
<xml_diff>
--- a/imageDesigner.pptx
+++ b/imageDesigner.pptx
@@ -6,6 +6,7 @@
   </p:sldMasterIdLst>
   <p:sldIdLst>
     <p:sldId id="256" r:id="rId2"/>
+    <p:sldId id="257" r:id="rId3"/>
   </p:sldIdLst>
   <p:sldSz cx="12192000" cy="6858000"/>
   <p:notesSz cx="6858000" cy="9144000"/>
@@ -104,6 +105,22 @@
       </a:defRPr>
     </a:lvl9pPr>
   </p:defaultTextStyle>
+  <p:extLst>
+    <p:ext uri="{EFAFB233-063F-42B5-8137-9DF3F51BA10A}">
+      <p15:sldGuideLst xmlns:p15="http://schemas.microsoft.com/office/powerpoint/2012/main">
+        <p15:guide id="1" orient="horz" pos="2160">
+          <p15:clr>
+            <a:srgbClr val="A4A3A4"/>
+          </p15:clr>
+        </p15:guide>
+        <p15:guide id="2" pos="3840">
+          <p15:clr>
+            <a:srgbClr val="A4A3A4"/>
+          </p15:clr>
+        </p15:guide>
+      </p15:sldGuideLst>
+    </p:ext>
+  </p:extLst>
 </p:presentation>
 </file>
 
@@ -238,7 +255,7 @@
           <a:p>
             <a:fld id="{A3CF5E85-F0AE-4020-842A-D0F96F6B62B1}" type="datetimeFigureOut">
               <a:rPr lang="en-US" smtClean="0"/>
-              <a:t>6/17/15</a:t>
+              <a:t>6/17/2015</a:t>
             </a:fld>
             <a:endParaRPr lang="en-US"/>
           </a:p>
@@ -408,7 +425,7 @@
           <a:p>
             <a:fld id="{A3CF5E85-F0AE-4020-842A-D0F96F6B62B1}" type="datetimeFigureOut">
               <a:rPr lang="en-US" smtClean="0"/>
-              <a:t>6/17/15</a:t>
+              <a:t>6/17/2015</a:t>
             </a:fld>
             <a:endParaRPr lang="en-US"/>
           </a:p>
@@ -588,7 +605,7 @@
           <a:p>
             <a:fld id="{A3CF5E85-F0AE-4020-842A-D0F96F6B62B1}" type="datetimeFigureOut">
               <a:rPr lang="en-US" smtClean="0"/>
-              <a:t>6/17/15</a:t>
+              <a:t>6/17/2015</a:t>
             </a:fld>
             <a:endParaRPr lang="en-US"/>
           </a:p>
@@ -758,7 +775,7 @@
           <a:p>
             <a:fld id="{A3CF5E85-F0AE-4020-842A-D0F96F6B62B1}" type="datetimeFigureOut">
               <a:rPr lang="en-US" smtClean="0"/>
-              <a:t>6/17/15</a:t>
+              <a:t>6/17/2015</a:t>
             </a:fld>
             <a:endParaRPr lang="en-US"/>
           </a:p>
@@ -1004,7 +1021,7 @@
           <a:p>
             <a:fld id="{A3CF5E85-F0AE-4020-842A-D0F96F6B62B1}" type="datetimeFigureOut">
               <a:rPr lang="en-US" smtClean="0"/>
-              <a:t>6/17/15</a:t>
+              <a:t>6/17/2015</a:t>
             </a:fld>
             <a:endParaRPr lang="en-US"/>
           </a:p>
@@ -1236,7 +1253,7 @@
           <a:p>
             <a:fld id="{A3CF5E85-F0AE-4020-842A-D0F96F6B62B1}" type="datetimeFigureOut">
               <a:rPr lang="en-US" smtClean="0"/>
-              <a:t>6/17/15</a:t>
+              <a:t>6/17/2015</a:t>
             </a:fld>
             <a:endParaRPr lang="en-US"/>
           </a:p>
@@ -1603,7 +1620,7 @@
           <a:p>
             <a:fld id="{A3CF5E85-F0AE-4020-842A-D0F96F6B62B1}" type="datetimeFigureOut">
               <a:rPr lang="en-US" smtClean="0"/>
-              <a:t>6/17/15</a:t>
+              <a:t>6/17/2015</a:t>
             </a:fld>
             <a:endParaRPr lang="en-US"/>
           </a:p>
@@ -1721,7 +1738,7 @@
           <a:p>
             <a:fld id="{A3CF5E85-F0AE-4020-842A-D0F96F6B62B1}" type="datetimeFigureOut">
               <a:rPr lang="en-US" smtClean="0"/>
-              <a:t>6/17/15</a:t>
+              <a:t>6/17/2015</a:t>
             </a:fld>
             <a:endParaRPr lang="en-US"/>
           </a:p>
@@ -1816,7 +1833,7 @@
           <a:p>
             <a:fld id="{A3CF5E85-F0AE-4020-842A-D0F96F6B62B1}" type="datetimeFigureOut">
               <a:rPr lang="en-US" smtClean="0"/>
-              <a:t>6/17/15</a:t>
+              <a:t>6/17/2015</a:t>
             </a:fld>
             <a:endParaRPr lang="en-US"/>
           </a:p>
@@ -2093,7 +2110,7 @@
           <a:p>
             <a:fld id="{A3CF5E85-F0AE-4020-842A-D0F96F6B62B1}" type="datetimeFigureOut">
               <a:rPr lang="en-US" smtClean="0"/>
-              <a:t>6/17/15</a:t>
+              <a:t>6/17/2015</a:t>
             </a:fld>
             <a:endParaRPr lang="en-US"/>
           </a:p>
@@ -2346,7 +2363,7 @@
           <a:p>
             <a:fld id="{A3CF5E85-F0AE-4020-842A-D0F96F6B62B1}" type="datetimeFigureOut">
               <a:rPr lang="en-US" smtClean="0"/>
-              <a:t>6/17/15</a:t>
+              <a:t>6/17/2015</a:t>
             </a:fld>
             <a:endParaRPr lang="en-US"/>
           </a:p>
@@ -2559,7 +2576,7 @@
           <a:p>
             <a:fld id="{A3CF5E85-F0AE-4020-842A-D0F96F6B62B1}" type="datetimeFigureOut">
               <a:rPr lang="en-US" smtClean="0"/>
-              <a:t>6/17/15</a:t>
+              <a:t>6/17/2015</a:t>
             </a:fld>
             <a:endParaRPr lang="en-US"/>
           </a:p>
@@ -3208,16 +3225,20 @@
             <a:avLst/>
           </a:prstGeom>
           <a:solidFill>
-            <a:srgbClr val="C00000"/>
+            <a:schemeClr val="tx1">
+              <a:lumMod val="50000"/>
+              <a:lumOff val="50000"/>
+            </a:schemeClr>
           </a:solidFill>
           <a:ln>
             <a:noFill/>
           </a:ln>
           <a:effectLst>
-            <a:glow rad="101600">
-              <a:srgbClr val="FF3300">
+            <a:glow rad="139700">
+              <a:schemeClr val="accent4">
+                <a:satMod val="175000"/>
                 <a:alpha val="40000"/>
-              </a:srgbClr>
+              </a:schemeClr>
             </a:glow>
             <a:outerShdw blurRad="190500" dist="228600" dir="2700000" algn="ctr">
               <a:srgbClr val="000000">
@@ -3286,16 +3307,20 @@
             <a:avLst/>
           </a:prstGeom>
           <a:solidFill>
-            <a:srgbClr val="C00000"/>
+            <a:schemeClr val="tx1">
+              <a:lumMod val="50000"/>
+              <a:lumOff val="50000"/>
+            </a:schemeClr>
           </a:solidFill>
           <a:ln>
             <a:noFill/>
           </a:ln>
           <a:effectLst>
-            <a:glow rad="101600">
-              <a:srgbClr val="FF3300">
+            <a:glow rad="139700">
+              <a:schemeClr val="accent4">
+                <a:satMod val="175000"/>
                 <a:alpha val="40000"/>
-              </a:srgbClr>
+              </a:schemeClr>
             </a:glow>
             <a:outerShdw blurRad="190500" dist="228600" dir="2700000" algn="ctr">
               <a:srgbClr val="000000">
@@ -3366,14 +3391,15 @@
           <a:noFill/>
           <a:ln w="76200">
             <a:solidFill>
-              <a:srgbClr val="7030A0"/>
+              <a:srgbClr val="FFC92F"/>
             </a:solidFill>
           </a:ln>
           <a:effectLst>
-            <a:glow rad="101600">
-              <a:srgbClr val="7030A0">
+            <a:glow rad="139700">
+              <a:schemeClr val="accent4">
+                <a:satMod val="175000"/>
                 <a:alpha val="40000"/>
-              </a:srgbClr>
+              </a:schemeClr>
             </a:glow>
           </a:effectLst>
           <a:scene3d>
@@ -3435,10 +3461,86 @@
   <p:timing>
     <p:tnLst>
       <p:par>
-        <p:cTn xmlns:p14="http://schemas.microsoft.com/office/powerpoint/2010/main" id="1" dur="indefinite" restart="never" nodeType="tmRoot"/>
+        <p:cTn id="1" dur="indefinite" restart="never" nodeType="tmRoot"/>
       </p:par>
     </p:tnLst>
   </p:timing>
+</p:sld>
+</file>
+
+<file path=ppt/slides/slide2.xml><?xml version="1.0" encoding="utf-8"?>
+<p:sld xmlns:a="http://schemas.openxmlformats.org/drawingml/2006/main" xmlns:r="http://schemas.openxmlformats.org/officeDocument/2006/relationships" xmlns:p="http://schemas.openxmlformats.org/presentationml/2006/main">
+  <p:cSld>
+    <p:spTree>
+      <p:nvGrpSpPr>
+        <p:cNvPr id="1" name=""/>
+        <p:cNvGrpSpPr/>
+        <p:nvPr/>
+      </p:nvGrpSpPr>
+      <p:grpSpPr>
+        <a:xfrm>
+          <a:off x="0" y="0"/>
+          <a:ext cx="0" cy="0"/>
+          <a:chOff x="0" y="0"/>
+          <a:chExt cx="0" cy="0"/>
+        </a:xfrm>
+      </p:grpSpPr>
+      <p:pic>
+        <p:nvPicPr>
+          <p:cNvPr id="5" name="Picture 4"/>
+          <p:cNvPicPr>
+            <a:picLocks noChangeAspect="1"/>
+          </p:cNvPicPr>
+          <p:nvPr/>
+        </p:nvPicPr>
+        <p:blipFill rotWithShape="1">
+          <a:blip r:embed="rId2"/>
+          <a:srcRect l="33502" t="14261" r="33488" b="27249"/>
+          <a:stretch/>
+        </p:blipFill>
+        <p:spPr>
+          <a:xfrm>
+            <a:off x="1769268" y="724807"/>
+            <a:ext cx="3140869" cy="3128963"/>
+          </a:xfrm>
+          <a:prstGeom prst="rect">
+            <a:avLst/>
+          </a:prstGeom>
+        </p:spPr>
+      </p:pic>
+      <p:pic>
+        <p:nvPicPr>
+          <p:cNvPr id="7" name="Picture 6"/>
+          <p:cNvPicPr>
+            <a:picLocks noChangeAspect="1"/>
+          </p:cNvPicPr>
+          <p:nvPr/>
+        </p:nvPicPr>
+        <p:blipFill rotWithShape="1">
+          <a:blip r:embed="rId3"/>
+          <a:srcRect l="33490" t="14038" r="33602" b="27232"/>
+          <a:stretch/>
+        </p:blipFill>
+        <p:spPr>
+          <a:xfrm>
+            <a:off x="5862296" y="702254"/>
+            <a:ext cx="3140869" cy="3151516"/>
+          </a:xfrm>
+          <a:prstGeom prst="rect">
+            <a:avLst/>
+          </a:prstGeom>
+        </p:spPr>
+      </p:pic>
+    </p:spTree>
+    <p:extLst>
+      <p:ext uri="{BB962C8B-B14F-4D97-AF65-F5344CB8AC3E}">
+        <p14:creationId xmlns:p14="http://schemas.microsoft.com/office/powerpoint/2010/main" val="655445312"/>
+      </p:ext>
+    </p:extLst>
+  </p:cSld>
+  <p:clrMapOvr>
+    <a:masterClrMapping/>
+  </p:clrMapOvr>
 </p:sld>
 </file>
 
@@ -3697,7 +3799,7 @@
   <a:extraClrSchemeLst/>
   <a:extLst>
     <a:ext uri="{05A4C25C-085E-4340-85A3-A5531E510DB2}">
-      <thm15:themeFamily xmlns:thm15="http://schemas.microsoft.com/office/thememl/2012/main" xmlns="" name="Office Theme" id="{62F939B6-93AF-4DB8-9C6B-D6C7DFDC589F}" vid="{4A3C46E8-61CC-4603-A589-7422A47A8E4A}"/>
+      <thm15:themeFamily xmlns:thm15="http://schemas.microsoft.com/office/thememl/2012/main" name="Office Theme" id="{62F939B6-93AF-4DB8-9C6B-D6C7DFDC589F}" vid="{4A3C46E8-61CC-4603-A589-7422A47A8E4A}"/>
     </a:ext>
   </a:extLst>
 </a:theme>

</xml_diff>